<commit_message>
updated week 2 after class
</commit_message>
<xml_diff>
--- a/week2/slides.pptx
+++ b/week2/slides.pptx
@@ -10428,11 +10428,51 @@
         <p:spPr/>
         <p:txBody>
           <a:bodyPr>
-            <a:normAutofit/>
+            <a:normAutofit fontScale="70000" lnSpcReduction="20000"/>
           </a:bodyPr>
           <a:lstStyle/>
           <a:p>
+            <a:r>
+              <a:rPr lang="en-US" sz="3200" b="1" dirty="0"/>
+              <a:t>IAM: Introduction to Algorithmic Marketing</a:t>
+            </a:r>
+          </a:p>
+          <a:p>
             <a:endParaRPr lang="en-US" sz="3200" b="1" dirty="0"/>
+          </a:p>
+          <a:p>
+            <a:r>
+              <a:rPr lang="en-US" sz="3200" b="1" dirty="0"/>
+              <a:t>1. Provide a specific (</a:t>
+            </a:r>
+            <a:r>
+              <a:rPr lang="en-US" sz="3200" b="1" dirty="0" err="1"/>
+              <a:t>ie</a:t>
+            </a:r>
+            <a:r>
+              <a:rPr lang="en-US" sz="3200" b="1" dirty="0"/>
+              <a:t>. give a specific company, brand that uses it, or a specific algorithm) example of each of the three types of search described in IAM.</a:t>
+            </a:r>
+          </a:p>
+          <a:p>
+            <a:r>
+              <a:rPr lang="en-US" sz="3200" b="1" dirty="0"/>
+              <a:t>2. Your data science and analytics team has built a model that is extremely accurate in providing relevant search results. Which of the variables (q, p, or v) in Formula 4.1 (IAM) would be most positively influenced by this new model?</a:t>
+            </a:r>
+          </a:p>
+          <a:p>
+            <a:r>
+              <a:rPr lang="en-US" sz="3200" b="1" dirty="0"/>
+              <a:t>3. What is one advantage and one disadvantage to removing </a:t>
+            </a:r>
+            <a:r>
+              <a:rPr lang="en-US" sz="3200" b="1" dirty="0" err="1"/>
+              <a:t>stopwords</a:t>
+            </a:r>
+            <a:r>
+              <a:rPr lang="en-US" sz="3200" b="1" dirty="0"/>
+              <a:t>?</a:t>
+            </a:r>
           </a:p>
         </p:txBody>
       </p:sp>

</xml_diff>